<commit_message>
Update to latest from Sasha (v4.50). ActiveX calls to Pulse tube are removed
</commit_message>
<xml_diff>
--- a/0. Documentation/Maintaining Leiden�s LabVIEW Software.pptx
+++ b/0. Documentation/Maintaining Leiden�s LabVIEW Software.pptx
@@ -165,10 +165,9 @@
           </a:lstStyle>
           <a:p>
             <a:r>
-              <a:rPr lang="en-US" smtClean="0"/>
+              <a:rPr lang="en-US"/>
               <a:t>Click to edit Master title style</a:t>
             </a:r>
-            <a:endParaRPr lang="en-US"/>
           </a:p>
         </p:txBody>
       </p:sp>
@@ -230,10 +229,9 @@
           </a:lstStyle>
           <a:p>
             <a:r>
-              <a:rPr lang="en-US" smtClean="0"/>
+              <a:rPr lang="en-US"/>
               <a:t>Click to edit Master subtitle style</a:t>
             </a:r>
-            <a:endParaRPr lang="en-US"/>
           </a:p>
         </p:txBody>
       </p:sp>
@@ -254,7 +252,7 @@
           <a:p>
             <a:fld id="{F748B4E7-A0FF-45DD-AFB0-2040D4A9992D}" type="datetimeFigureOut">
               <a:rPr lang="en-US" smtClean="0"/>
-              <a:t>9/1/2017</a:t>
+              <a:t>3/20/2020</a:t>
             </a:fld>
             <a:endParaRPr lang="en-US"/>
           </a:p>
@@ -348,10 +346,9 @@
           <a:lstStyle/>
           <a:p>
             <a:r>
-              <a:rPr lang="en-US" smtClean="0"/>
+              <a:rPr lang="en-US"/>
               <a:t>Click to edit Master title style</a:t>
             </a:r>
-            <a:endParaRPr lang="en-US"/>
           </a:p>
         </p:txBody>
       </p:sp>
@@ -372,38 +369,37 @@
           <a:p>
             <a:pPr lvl="0"/>
             <a:r>
-              <a:rPr lang="en-US" smtClean="0"/>
+              <a:rPr lang="en-US"/>
               <a:t>Click to edit Master text styles</a:t>
             </a:r>
           </a:p>
           <a:p>
             <a:pPr lvl="1"/>
             <a:r>
-              <a:rPr lang="en-US" smtClean="0"/>
+              <a:rPr lang="en-US"/>
               <a:t>Second level</a:t>
             </a:r>
           </a:p>
           <a:p>
             <a:pPr lvl="2"/>
             <a:r>
-              <a:rPr lang="en-US" smtClean="0"/>
+              <a:rPr lang="en-US"/>
               <a:t>Third level</a:t>
             </a:r>
           </a:p>
           <a:p>
             <a:pPr lvl="3"/>
             <a:r>
-              <a:rPr lang="en-US" smtClean="0"/>
+              <a:rPr lang="en-US"/>
               <a:t>Fourth level</a:t>
             </a:r>
           </a:p>
           <a:p>
             <a:pPr lvl="4"/>
             <a:r>
-              <a:rPr lang="en-US" smtClean="0"/>
+              <a:rPr lang="en-US"/>
               <a:t>Fifth level</a:t>
             </a:r>
-            <a:endParaRPr lang="en-US"/>
           </a:p>
         </p:txBody>
       </p:sp>
@@ -424,7 +420,7 @@
           <a:p>
             <a:fld id="{F748B4E7-A0FF-45DD-AFB0-2040D4A9992D}" type="datetimeFigureOut">
               <a:rPr lang="en-US" smtClean="0"/>
-              <a:t>9/1/2017</a:t>
+              <a:t>3/20/2020</a:t>
             </a:fld>
             <a:endParaRPr lang="en-US"/>
           </a:p>
@@ -523,10 +519,9 @@
           <a:lstStyle/>
           <a:p>
             <a:r>
-              <a:rPr lang="en-US" smtClean="0"/>
+              <a:rPr lang="en-US"/>
               <a:t>Click to edit Master title style</a:t>
             </a:r>
-            <a:endParaRPr lang="en-US"/>
           </a:p>
         </p:txBody>
       </p:sp>
@@ -552,38 +547,37 @@
           <a:p>
             <a:pPr lvl="0"/>
             <a:r>
-              <a:rPr lang="en-US" smtClean="0"/>
+              <a:rPr lang="en-US"/>
               <a:t>Click to edit Master text styles</a:t>
             </a:r>
           </a:p>
           <a:p>
             <a:pPr lvl="1"/>
             <a:r>
-              <a:rPr lang="en-US" smtClean="0"/>
+              <a:rPr lang="en-US"/>
               <a:t>Second level</a:t>
             </a:r>
           </a:p>
           <a:p>
             <a:pPr lvl="2"/>
             <a:r>
-              <a:rPr lang="en-US" smtClean="0"/>
+              <a:rPr lang="en-US"/>
               <a:t>Third level</a:t>
             </a:r>
           </a:p>
           <a:p>
             <a:pPr lvl="3"/>
             <a:r>
-              <a:rPr lang="en-US" smtClean="0"/>
+              <a:rPr lang="en-US"/>
               <a:t>Fourth level</a:t>
             </a:r>
           </a:p>
           <a:p>
             <a:pPr lvl="4"/>
             <a:r>
-              <a:rPr lang="en-US" smtClean="0"/>
+              <a:rPr lang="en-US"/>
               <a:t>Fifth level</a:t>
             </a:r>
-            <a:endParaRPr lang="en-US"/>
           </a:p>
         </p:txBody>
       </p:sp>
@@ -604,7 +598,7 @@
           <a:p>
             <a:fld id="{F748B4E7-A0FF-45DD-AFB0-2040D4A9992D}" type="datetimeFigureOut">
               <a:rPr lang="en-US" smtClean="0"/>
-              <a:t>9/1/2017</a:t>
+              <a:t>3/20/2020</a:t>
             </a:fld>
             <a:endParaRPr lang="en-US"/>
           </a:p>
@@ -698,10 +692,9 @@
           <a:lstStyle/>
           <a:p>
             <a:r>
-              <a:rPr lang="en-US" smtClean="0"/>
+              <a:rPr lang="en-US"/>
               <a:t>Click to edit Master title style</a:t>
             </a:r>
-            <a:endParaRPr lang="en-US"/>
           </a:p>
         </p:txBody>
       </p:sp>
@@ -722,38 +715,37 @@
           <a:p>
             <a:pPr lvl="0"/>
             <a:r>
-              <a:rPr lang="en-US" smtClean="0"/>
+              <a:rPr lang="en-US"/>
               <a:t>Click to edit Master text styles</a:t>
             </a:r>
           </a:p>
           <a:p>
             <a:pPr lvl="1"/>
             <a:r>
-              <a:rPr lang="en-US" smtClean="0"/>
+              <a:rPr lang="en-US"/>
               <a:t>Second level</a:t>
             </a:r>
           </a:p>
           <a:p>
             <a:pPr lvl="2"/>
             <a:r>
-              <a:rPr lang="en-US" smtClean="0"/>
+              <a:rPr lang="en-US"/>
               <a:t>Third level</a:t>
             </a:r>
           </a:p>
           <a:p>
             <a:pPr lvl="3"/>
             <a:r>
-              <a:rPr lang="en-US" smtClean="0"/>
+              <a:rPr lang="en-US"/>
               <a:t>Fourth level</a:t>
             </a:r>
           </a:p>
           <a:p>
             <a:pPr lvl="4"/>
             <a:r>
-              <a:rPr lang="en-US" smtClean="0"/>
+              <a:rPr lang="en-US"/>
               <a:t>Fifth level</a:t>
             </a:r>
-            <a:endParaRPr lang="en-US"/>
           </a:p>
         </p:txBody>
       </p:sp>
@@ -774,7 +766,7 @@
           <a:p>
             <a:fld id="{F748B4E7-A0FF-45DD-AFB0-2040D4A9992D}" type="datetimeFigureOut">
               <a:rPr lang="en-US" smtClean="0"/>
-              <a:t>9/1/2017</a:t>
+              <a:t>3/20/2020</a:t>
             </a:fld>
             <a:endParaRPr lang="en-US"/>
           </a:p>
@@ -877,10 +869,9 @@
           </a:lstStyle>
           <a:p>
             <a:r>
-              <a:rPr lang="en-US" smtClean="0"/>
+              <a:rPr lang="en-US"/>
               <a:t>Click to edit Master title style</a:t>
             </a:r>
-            <a:endParaRPr lang="en-US"/>
           </a:p>
         </p:txBody>
       </p:sp>
@@ -997,7 +988,7 @@
           <a:p>
             <a:pPr lvl="0"/>
             <a:r>
-              <a:rPr lang="en-US" smtClean="0"/>
+              <a:rPr lang="en-US"/>
               <a:t>Click to edit Master text styles</a:t>
             </a:r>
           </a:p>
@@ -1020,7 +1011,7 @@
           <a:p>
             <a:fld id="{F748B4E7-A0FF-45DD-AFB0-2040D4A9992D}" type="datetimeFigureOut">
               <a:rPr lang="en-US" smtClean="0"/>
-              <a:t>9/1/2017</a:t>
+              <a:t>3/20/2020</a:t>
             </a:fld>
             <a:endParaRPr lang="en-US"/>
           </a:p>
@@ -1114,10 +1105,9 @@
           <a:lstStyle/>
           <a:p>
             <a:r>
-              <a:rPr lang="en-US" smtClean="0"/>
+              <a:rPr lang="en-US"/>
               <a:t>Click to edit Master title style</a:t>
             </a:r>
-            <a:endParaRPr lang="en-US"/>
           </a:p>
         </p:txBody>
       </p:sp>
@@ -1143,38 +1133,37 @@
           <a:p>
             <a:pPr lvl="0"/>
             <a:r>
-              <a:rPr lang="en-US" smtClean="0"/>
+              <a:rPr lang="en-US"/>
               <a:t>Click to edit Master text styles</a:t>
             </a:r>
           </a:p>
           <a:p>
             <a:pPr lvl="1"/>
             <a:r>
-              <a:rPr lang="en-US" smtClean="0"/>
+              <a:rPr lang="en-US"/>
               <a:t>Second level</a:t>
             </a:r>
           </a:p>
           <a:p>
             <a:pPr lvl="2"/>
             <a:r>
-              <a:rPr lang="en-US" smtClean="0"/>
+              <a:rPr lang="en-US"/>
               <a:t>Third level</a:t>
             </a:r>
           </a:p>
           <a:p>
             <a:pPr lvl="3"/>
             <a:r>
-              <a:rPr lang="en-US" smtClean="0"/>
+              <a:rPr lang="en-US"/>
               <a:t>Fourth level</a:t>
             </a:r>
           </a:p>
           <a:p>
             <a:pPr lvl="4"/>
             <a:r>
-              <a:rPr lang="en-US" smtClean="0"/>
+              <a:rPr lang="en-US"/>
               <a:t>Fifth level</a:t>
             </a:r>
-            <a:endParaRPr lang="en-US"/>
           </a:p>
         </p:txBody>
       </p:sp>
@@ -1200,38 +1189,37 @@
           <a:p>
             <a:pPr lvl="0"/>
             <a:r>
-              <a:rPr lang="en-US" smtClean="0"/>
+              <a:rPr lang="en-US"/>
               <a:t>Click to edit Master text styles</a:t>
             </a:r>
           </a:p>
           <a:p>
             <a:pPr lvl="1"/>
             <a:r>
-              <a:rPr lang="en-US" smtClean="0"/>
+              <a:rPr lang="en-US"/>
               <a:t>Second level</a:t>
             </a:r>
           </a:p>
           <a:p>
             <a:pPr lvl="2"/>
             <a:r>
-              <a:rPr lang="en-US" smtClean="0"/>
+              <a:rPr lang="en-US"/>
               <a:t>Third level</a:t>
             </a:r>
           </a:p>
           <a:p>
             <a:pPr lvl="3"/>
             <a:r>
-              <a:rPr lang="en-US" smtClean="0"/>
+              <a:rPr lang="en-US"/>
               <a:t>Fourth level</a:t>
             </a:r>
           </a:p>
           <a:p>
             <a:pPr lvl="4"/>
             <a:r>
-              <a:rPr lang="en-US" smtClean="0"/>
+              <a:rPr lang="en-US"/>
               <a:t>Fifth level</a:t>
             </a:r>
-            <a:endParaRPr lang="en-US"/>
           </a:p>
         </p:txBody>
       </p:sp>
@@ -1252,7 +1240,7 @@
           <a:p>
             <a:fld id="{F748B4E7-A0FF-45DD-AFB0-2040D4A9992D}" type="datetimeFigureOut">
               <a:rPr lang="en-US" smtClean="0"/>
-              <a:t>9/1/2017</a:t>
+              <a:t>3/20/2020</a:t>
             </a:fld>
             <a:endParaRPr lang="en-US"/>
           </a:p>
@@ -1351,10 +1339,9 @@
           <a:lstStyle/>
           <a:p>
             <a:r>
-              <a:rPr lang="en-US" smtClean="0"/>
+              <a:rPr lang="en-US"/>
               <a:t>Click to edit Master title style</a:t>
             </a:r>
-            <a:endParaRPr lang="en-US"/>
           </a:p>
         </p:txBody>
       </p:sp>
@@ -1417,7 +1404,7 @@
           <a:p>
             <a:pPr lvl="0"/>
             <a:r>
-              <a:rPr lang="en-US" smtClean="0"/>
+              <a:rPr lang="en-US"/>
               <a:t>Click to edit Master text styles</a:t>
             </a:r>
           </a:p>
@@ -1445,38 +1432,37 @@
           <a:p>
             <a:pPr lvl="0"/>
             <a:r>
-              <a:rPr lang="en-US" smtClean="0"/>
+              <a:rPr lang="en-US"/>
               <a:t>Click to edit Master text styles</a:t>
             </a:r>
           </a:p>
           <a:p>
             <a:pPr lvl="1"/>
             <a:r>
-              <a:rPr lang="en-US" smtClean="0"/>
+              <a:rPr lang="en-US"/>
               <a:t>Second level</a:t>
             </a:r>
           </a:p>
           <a:p>
             <a:pPr lvl="2"/>
             <a:r>
-              <a:rPr lang="en-US" smtClean="0"/>
+              <a:rPr lang="en-US"/>
               <a:t>Third level</a:t>
             </a:r>
           </a:p>
           <a:p>
             <a:pPr lvl="3"/>
             <a:r>
-              <a:rPr lang="en-US" smtClean="0"/>
+              <a:rPr lang="en-US"/>
               <a:t>Fourth level</a:t>
             </a:r>
           </a:p>
           <a:p>
             <a:pPr lvl="4"/>
             <a:r>
-              <a:rPr lang="en-US" smtClean="0"/>
+              <a:rPr lang="en-US"/>
               <a:t>Fifth level</a:t>
             </a:r>
-            <a:endParaRPr lang="en-US"/>
           </a:p>
         </p:txBody>
       </p:sp>
@@ -1539,7 +1525,7 @@
           <a:p>
             <a:pPr lvl="0"/>
             <a:r>
-              <a:rPr lang="en-US" smtClean="0"/>
+              <a:rPr lang="en-US"/>
               <a:t>Click to edit Master text styles</a:t>
             </a:r>
           </a:p>
@@ -1567,38 +1553,37 @@
           <a:p>
             <a:pPr lvl="0"/>
             <a:r>
-              <a:rPr lang="en-US" smtClean="0"/>
+              <a:rPr lang="en-US"/>
               <a:t>Click to edit Master text styles</a:t>
             </a:r>
           </a:p>
           <a:p>
             <a:pPr lvl="1"/>
             <a:r>
-              <a:rPr lang="en-US" smtClean="0"/>
+              <a:rPr lang="en-US"/>
               <a:t>Second level</a:t>
             </a:r>
           </a:p>
           <a:p>
             <a:pPr lvl="2"/>
             <a:r>
-              <a:rPr lang="en-US" smtClean="0"/>
+              <a:rPr lang="en-US"/>
               <a:t>Third level</a:t>
             </a:r>
           </a:p>
           <a:p>
             <a:pPr lvl="3"/>
             <a:r>
-              <a:rPr lang="en-US" smtClean="0"/>
+              <a:rPr lang="en-US"/>
               <a:t>Fourth level</a:t>
             </a:r>
           </a:p>
           <a:p>
             <a:pPr lvl="4"/>
             <a:r>
-              <a:rPr lang="en-US" smtClean="0"/>
+              <a:rPr lang="en-US"/>
               <a:t>Fifth level</a:t>
             </a:r>
-            <a:endParaRPr lang="en-US"/>
           </a:p>
         </p:txBody>
       </p:sp>
@@ -1619,7 +1604,7 @@
           <a:p>
             <a:fld id="{F748B4E7-A0FF-45DD-AFB0-2040D4A9992D}" type="datetimeFigureOut">
               <a:rPr lang="en-US" smtClean="0"/>
-              <a:t>9/1/2017</a:t>
+              <a:t>3/20/2020</a:t>
             </a:fld>
             <a:endParaRPr lang="en-US"/>
           </a:p>
@@ -1713,10 +1698,9 @@
           <a:lstStyle/>
           <a:p>
             <a:r>
-              <a:rPr lang="en-US" smtClean="0"/>
+              <a:rPr lang="en-US"/>
               <a:t>Click to edit Master title style</a:t>
             </a:r>
-            <a:endParaRPr lang="en-US"/>
           </a:p>
         </p:txBody>
       </p:sp>
@@ -1737,7 +1721,7 @@
           <a:p>
             <a:fld id="{F748B4E7-A0FF-45DD-AFB0-2040D4A9992D}" type="datetimeFigureOut">
               <a:rPr lang="en-US" smtClean="0"/>
-              <a:t>9/1/2017</a:t>
+              <a:t>3/20/2020</a:t>
             </a:fld>
             <a:endParaRPr lang="en-US"/>
           </a:p>
@@ -1832,7 +1816,7 @@
           <a:p>
             <a:fld id="{F748B4E7-A0FF-45DD-AFB0-2040D4A9992D}" type="datetimeFigureOut">
               <a:rPr lang="en-US" smtClean="0"/>
-              <a:t>9/1/2017</a:t>
+              <a:t>3/20/2020</a:t>
             </a:fld>
             <a:endParaRPr lang="en-US"/>
           </a:p>
@@ -1935,10 +1919,9 @@
           </a:lstStyle>
           <a:p>
             <a:r>
-              <a:rPr lang="en-US" smtClean="0"/>
+              <a:rPr lang="en-US"/>
               <a:t>Click to edit Master title style</a:t>
             </a:r>
-            <a:endParaRPr lang="en-US"/>
           </a:p>
         </p:txBody>
       </p:sp>
@@ -1992,38 +1975,37 @@
           <a:p>
             <a:pPr lvl="0"/>
             <a:r>
-              <a:rPr lang="en-US" smtClean="0"/>
+              <a:rPr lang="en-US"/>
               <a:t>Click to edit Master text styles</a:t>
             </a:r>
           </a:p>
           <a:p>
             <a:pPr lvl="1"/>
             <a:r>
-              <a:rPr lang="en-US" smtClean="0"/>
+              <a:rPr lang="en-US"/>
               <a:t>Second level</a:t>
             </a:r>
           </a:p>
           <a:p>
             <a:pPr lvl="2"/>
             <a:r>
-              <a:rPr lang="en-US" smtClean="0"/>
+              <a:rPr lang="en-US"/>
               <a:t>Third level</a:t>
             </a:r>
           </a:p>
           <a:p>
             <a:pPr lvl="3"/>
             <a:r>
-              <a:rPr lang="en-US" smtClean="0"/>
+              <a:rPr lang="en-US"/>
               <a:t>Fourth level</a:t>
             </a:r>
           </a:p>
           <a:p>
             <a:pPr lvl="4"/>
             <a:r>
-              <a:rPr lang="en-US" smtClean="0"/>
+              <a:rPr lang="en-US"/>
               <a:t>Fifth level</a:t>
             </a:r>
-            <a:endParaRPr lang="en-US"/>
           </a:p>
         </p:txBody>
       </p:sp>
@@ -2086,7 +2068,7 @@
           <a:p>
             <a:pPr lvl="0"/>
             <a:r>
-              <a:rPr lang="en-US" smtClean="0"/>
+              <a:rPr lang="en-US"/>
               <a:t>Click to edit Master text styles</a:t>
             </a:r>
           </a:p>
@@ -2109,7 +2091,7 @@
           <a:p>
             <a:fld id="{F748B4E7-A0FF-45DD-AFB0-2040D4A9992D}" type="datetimeFigureOut">
               <a:rPr lang="en-US" smtClean="0"/>
-              <a:t>9/1/2017</a:t>
+              <a:t>3/20/2020</a:t>
             </a:fld>
             <a:endParaRPr lang="en-US"/>
           </a:p>
@@ -2212,10 +2194,9 @@
           </a:lstStyle>
           <a:p>
             <a:r>
-              <a:rPr lang="en-US" smtClean="0"/>
+              <a:rPr lang="en-US"/>
               <a:t>Click to edit Master title style</a:t>
             </a:r>
-            <a:endParaRPr lang="en-US"/>
           </a:p>
         </p:txBody>
       </p:sp>
@@ -2339,7 +2320,7 @@
           <a:p>
             <a:pPr lvl="0"/>
             <a:r>
-              <a:rPr lang="en-US" smtClean="0"/>
+              <a:rPr lang="en-US"/>
               <a:t>Click to edit Master text styles</a:t>
             </a:r>
           </a:p>
@@ -2362,7 +2343,7 @@
           <a:p>
             <a:fld id="{F748B4E7-A0FF-45DD-AFB0-2040D4A9992D}" type="datetimeFigureOut">
               <a:rPr lang="en-US" smtClean="0"/>
-              <a:t>9/1/2017</a:t>
+              <a:t>3/20/2020</a:t>
             </a:fld>
             <a:endParaRPr lang="en-US"/>
           </a:p>
@@ -2471,10 +2452,9 @@
           <a:lstStyle/>
           <a:p>
             <a:r>
-              <a:rPr lang="en-US" smtClean="0"/>
+              <a:rPr lang="en-US"/>
               <a:t>Click to edit Master title style</a:t>
             </a:r>
-            <a:endParaRPr lang="en-US"/>
           </a:p>
         </p:txBody>
       </p:sp>
@@ -2505,38 +2485,37 @@
           <a:p>
             <a:pPr lvl="0"/>
             <a:r>
-              <a:rPr lang="en-US" smtClean="0"/>
+              <a:rPr lang="en-US"/>
               <a:t>Click to edit Master text styles</a:t>
             </a:r>
           </a:p>
           <a:p>
             <a:pPr lvl="1"/>
             <a:r>
-              <a:rPr lang="en-US" smtClean="0"/>
+              <a:rPr lang="en-US"/>
               <a:t>Second level</a:t>
             </a:r>
           </a:p>
           <a:p>
             <a:pPr lvl="2"/>
             <a:r>
-              <a:rPr lang="en-US" smtClean="0"/>
+              <a:rPr lang="en-US"/>
               <a:t>Third level</a:t>
             </a:r>
           </a:p>
           <a:p>
             <a:pPr lvl="3"/>
             <a:r>
-              <a:rPr lang="en-US" smtClean="0"/>
+              <a:rPr lang="en-US"/>
               <a:t>Fourth level</a:t>
             </a:r>
           </a:p>
           <a:p>
             <a:pPr lvl="4"/>
             <a:r>
-              <a:rPr lang="en-US" smtClean="0"/>
+              <a:rPr lang="en-US"/>
               <a:t>Fifth level</a:t>
             </a:r>
-            <a:endParaRPr lang="en-US"/>
           </a:p>
         </p:txBody>
       </p:sp>
@@ -2575,7 +2554,7 @@
           <a:p>
             <a:fld id="{F748B4E7-A0FF-45DD-AFB0-2040D4A9992D}" type="datetimeFigureOut">
               <a:rPr lang="en-US" smtClean="0"/>
-              <a:t>9/1/2017</a:t>
+              <a:t>3/20/2020</a:t>
             </a:fld>
             <a:endParaRPr lang="en-US"/>
           </a:p>
@@ -2996,10 +2975,9 @@
           <a:lstStyle/>
           <a:p>
             <a:r>
-              <a:rPr lang="en-US" dirty="0" smtClean="0"/>
+              <a:rPr lang="en-US" dirty="0"/>
               <a:t>Maintaining Leiden’s LabVIEW Software</a:t>
             </a:r>
-            <a:endParaRPr lang="en-US" dirty="0"/>
           </a:p>
         </p:txBody>
       </p:sp>
@@ -3068,10 +3046,9 @@
           <a:lstStyle/>
           <a:p>
             <a:r>
-              <a:rPr lang="en-US" dirty="0" smtClean="0"/>
+              <a:rPr lang="en-US" dirty="0"/>
               <a:t>Updating FP.vi 1</a:t>
             </a:r>
-            <a:endParaRPr lang="en-US" dirty="0"/>
           </a:p>
         </p:txBody>
       </p:sp>
@@ -3091,14 +3068,9 @@
           <a:lstStyle/>
           <a:p>
             <a:r>
-              <a:rPr lang="en-US" dirty="0" smtClean="0"/>
-              <a:t>We will do analogous changes as we did for </a:t>
-            </a:r>
-            <a:r>
-              <a:rPr lang="en-US" dirty="0" smtClean="0"/>
-              <a:t>TC.vi</a:t>
-            </a:r>
-            <a:endParaRPr lang="en-US" dirty="0" smtClean="0"/>
+              <a:rPr lang="en-US" dirty="0"/>
+              <a:t>We will do analogous changes as we did for TC.vi</a:t>
+            </a:r>
           </a:p>
         </p:txBody>
       </p:sp>
@@ -3148,10 +3120,9 @@
           <a:lstStyle/>
           <a:p>
             <a:r>
-              <a:rPr lang="en-US" dirty="0" smtClean="0"/>
+              <a:rPr lang="en-US" dirty="0"/>
               <a:t>Updating FP.vi 2</a:t>
             </a:r>
-            <a:endParaRPr lang="en-US" dirty="0"/>
           </a:p>
         </p:txBody>
       </p:sp>
@@ -3176,82 +3147,306 @@
           <a:lstStyle/>
           <a:p>
             <a:r>
-              <a:rPr lang="en-US" dirty="0" smtClean="0"/>
-              <a:t>make </a:t>
-            </a:r>
-            <a:r>
-              <a:rPr lang="en-US" dirty="0" smtClean="0"/>
-              <a:t>the timeout event look like this:</a:t>
-            </a:r>
-            <a:endParaRPr lang="en-US" dirty="0"/>
+              <a:rPr lang="en-US" dirty="0"/>
+              <a:t>make the timeout event look like this:</a:t>
+            </a:r>
           </a:p>
         </p:txBody>
       </p:sp>
       <p:pic>
         <p:nvPicPr>
-          <p:cNvPr id="8" name="Picture 7" descr="Screen Clipping"/>
+          <p:cNvPr id="4" name="Picture 3">
+            <a:extLst>
+              <a:ext uri="{FF2B5EF4-FFF2-40B4-BE49-F238E27FC236}">
+                <a16:creationId xmlns:a16="http://schemas.microsoft.com/office/drawing/2014/main" id="{3EE0AD62-C09C-4967-AAC0-AB0862247966}"/>
+              </a:ext>
+            </a:extLst>
+          </p:cNvPr>
           <p:cNvPicPr>
             <a:picLocks noChangeAspect="1"/>
           </p:cNvPicPr>
           <p:nvPr/>
         </p:nvPicPr>
         <p:blipFill>
-          <a:blip r:embed="rId2">
-            <a:extLst>
-              <a:ext uri="{28A0092B-C50C-407E-A947-70E740481C1C}">
-                <a14:useLocalDpi xmlns:a14="http://schemas.microsoft.com/office/drawing/2010/main" val="0"/>
-              </a:ext>
-            </a:extLst>
-          </a:blip>
+          <a:blip r:embed="rId2"/>
           <a:stretch>
             <a:fillRect/>
           </a:stretch>
         </p:blipFill>
         <p:spPr>
           <a:xfrm>
-            <a:off x="141310" y="2450352"/>
-            <a:ext cx="8711745" cy="4263352"/>
+            <a:off x="230555" y="2314021"/>
+            <a:ext cx="8416296" cy="4013162"/>
           </a:xfrm>
           <a:prstGeom prst="rect">
             <a:avLst/>
           </a:prstGeom>
         </p:spPr>
       </p:pic>
+      <p:sp>
+        <p:nvSpPr>
+          <p:cNvPr id="5" name="Rectangle 4">
+            <a:extLst>
+              <a:ext uri="{FF2B5EF4-FFF2-40B4-BE49-F238E27FC236}">
+                <a16:creationId xmlns:a16="http://schemas.microsoft.com/office/drawing/2014/main" id="{DD82404F-7F7E-4C7D-9019-BDC526715AF6}"/>
+              </a:ext>
+            </a:extLst>
+          </p:cNvPr>
+          <p:cNvSpPr/>
+          <p:nvPr/>
+        </p:nvSpPr>
+        <p:spPr>
+          <a:xfrm>
+            <a:off x="1305017" y="4128116"/>
+            <a:ext cx="1562470" cy="852257"/>
+          </a:xfrm>
+          <a:prstGeom prst="rect">
+            <a:avLst/>
+          </a:prstGeom>
+          <a:noFill/>
+          <a:ln w="28575">
+            <a:solidFill>
+              <a:srgbClr val="FF0000"/>
+            </a:solidFill>
+          </a:ln>
+        </p:spPr>
+        <p:style>
+          <a:lnRef idx="2">
+            <a:schemeClr val="accent1">
+              <a:shade val="50000"/>
+            </a:schemeClr>
+          </a:lnRef>
+          <a:fillRef idx="1">
+            <a:schemeClr val="accent1"/>
+          </a:fillRef>
+          <a:effectRef idx="0">
+            <a:schemeClr val="accent1"/>
+          </a:effectRef>
+          <a:fontRef idx="minor">
+            <a:schemeClr val="lt1"/>
+          </a:fontRef>
+        </p:style>
+        <p:txBody>
+          <a:bodyPr rtlCol="0" anchor="ctr"/>
+          <a:lstStyle/>
+          <a:p>
+            <a:pPr algn="ctr"/>
+            <a:endParaRPr lang="en-US"/>
+          </a:p>
+        </p:txBody>
+      </p:sp>
+      <p:sp>
+        <p:nvSpPr>
+          <p:cNvPr id="10" name="Rectangle 9">
+            <a:extLst>
+              <a:ext uri="{FF2B5EF4-FFF2-40B4-BE49-F238E27FC236}">
+                <a16:creationId xmlns:a16="http://schemas.microsoft.com/office/drawing/2014/main" id="{14ADD071-D7FA-46B5-BCC7-37AE369EB4C0}"/>
+              </a:ext>
+            </a:extLst>
+          </p:cNvPr>
+          <p:cNvSpPr/>
+          <p:nvPr/>
+        </p:nvSpPr>
+        <p:spPr>
+          <a:xfrm>
+            <a:off x="5965794" y="4128116"/>
+            <a:ext cx="523784" cy="479395"/>
+          </a:xfrm>
+          <a:prstGeom prst="rect">
+            <a:avLst/>
+          </a:prstGeom>
+          <a:noFill/>
+          <a:ln w="28575">
+            <a:solidFill>
+              <a:srgbClr val="FF0000"/>
+            </a:solidFill>
+          </a:ln>
+        </p:spPr>
+        <p:style>
+          <a:lnRef idx="2">
+            <a:schemeClr val="accent1">
+              <a:shade val="50000"/>
+            </a:schemeClr>
+          </a:lnRef>
+          <a:fillRef idx="1">
+            <a:schemeClr val="accent1"/>
+          </a:fillRef>
+          <a:effectRef idx="0">
+            <a:schemeClr val="accent1"/>
+          </a:effectRef>
+          <a:fontRef idx="minor">
+            <a:schemeClr val="lt1"/>
+          </a:fontRef>
+        </p:style>
+        <p:txBody>
+          <a:bodyPr rtlCol="0" anchor="ctr"/>
+          <a:lstStyle/>
+          <a:p>
+            <a:pPr algn="ctr"/>
+            <a:endParaRPr lang="en-US"/>
+          </a:p>
+        </p:txBody>
+      </p:sp>
       <p:pic>
         <p:nvPicPr>
-          <p:cNvPr id="9" name="Picture 8" descr="Screen Clipping"/>
+          <p:cNvPr id="11" name="Picture 10">
+            <a:extLst>
+              <a:ext uri="{FF2B5EF4-FFF2-40B4-BE49-F238E27FC236}">
+                <a16:creationId xmlns:a16="http://schemas.microsoft.com/office/drawing/2014/main" id="{BD5BDA3A-36DE-45F3-A856-E3CA5F98B5C6}"/>
+              </a:ext>
+            </a:extLst>
+          </p:cNvPr>
           <p:cNvPicPr>
             <a:picLocks noChangeAspect="1"/>
           </p:cNvPicPr>
           <p:nvPr/>
         </p:nvPicPr>
-        <p:blipFill>
-          <a:blip r:embed="rId3">
-            <a:extLst>
-              <a:ext uri="{28A0092B-C50C-407E-A947-70E740481C1C}">
-                <a14:useLocalDpi xmlns:a14="http://schemas.microsoft.com/office/drawing/2010/main" val="0"/>
-              </a:ext>
-            </a:extLst>
-          </a:blip>
-          <a:stretch>
-            <a:fillRect/>
-          </a:stretch>
+        <p:blipFill rotWithShape="1">
+          <a:blip r:embed="rId2"/>
+          <a:srcRect l="12341" t="45867" r="68461" b="33560"/>
+          <a:stretch/>
         </p:blipFill>
         <p:spPr>
           <a:xfrm>
-            <a:off x="9588066" y="2721930"/>
-            <a:ext cx="2076740" cy="790685"/>
+            <a:off x="7137647" y="1056758"/>
+            <a:ext cx="1615736" cy="825624"/>
           </a:xfrm>
           <a:prstGeom prst="rect">
             <a:avLst/>
           </a:prstGeom>
-          <a:ln>
+          <a:ln w="28575">
             <a:solidFill>
               <a:srgbClr val="FF0000"/>
             </a:solidFill>
           </a:ln>
         </p:spPr>
       </p:pic>
+      <p:pic>
+        <p:nvPicPr>
+          <p:cNvPr id="13" name="Picture 12">
+            <a:extLst>
+              <a:ext uri="{FF2B5EF4-FFF2-40B4-BE49-F238E27FC236}">
+                <a16:creationId xmlns:a16="http://schemas.microsoft.com/office/drawing/2014/main" id="{17069C7F-C703-4182-A351-CE5225433F47}"/>
+              </a:ext>
+            </a:extLst>
+          </p:cNvPr>
+          <p:cNvPicPr>
+            <a:picLocks noChangeAspect="1"/>
+          </p:cNvPicPr>
+          <p:nvPr/>
+        </p:nvPicPr>
+        <p:blipFill rotWithShape="1">
+          <a:blip r:embed="rId2"/>
+          <a:srcRect l="67253" t="40197" r="24261" b="40833"/>
+          <a:stretch/>
+        </p:blipFill>
+        <p:spPr>
+          <a:xfrm>
+            <a:off x="9832420" y="981310"/>
+            <a:ext cx="714252" cy="761260"/>
+          </a:xfrm>
+          <a:prstGeom prst="rect">
+            <a:avLst/>
+          </a:prstGeom>
+          <a:ln w="28575">
+            <a:solidFill>
+              <a:srgbClr val="FF0000"/>
+            </a:solidFill>
+          </a:ln>
+        </p:spPr>
+      </p:pic>
+      <p:cxnSp>
+        <p:nvCxnSpPr>
+          <p:cNvPr id="14" name="Straight Arrow Connector 13">
+            <a:extLst>
+              <a:ext uri="{FF2B5EF4-FFF2-40B4-BE49-F238E27FC236}">
+                <a16:creationId xmlns:a16="http://schemas.microsoft.com/office/drawing/2014/main" id="{195033C9-CC9C-4D55-9E80-25EA67873630}"/>
+              </a:ext>
+            </a:extLst>
+          </p:cNvPr>
+          <p:cNvCxnSpPr>
+            <a:cxnSpLocks/>
+            <a:stCxn id="11" idx="2"/>
+            <a:endCxn id="5" idx="0"/>
+          </p:cNvCxnSpPr>
+          <p:nvPr/>
+        </p:nvCxnSpPr>
+        <p:spPr>
+          <a:xfrm flipH="1">
+            <a:off x="2086252" y="1882382"/>
+            <a:ext cx="5859263" cy="2245734"/>
+          </a:xfrm>
+          <a:prstGeom prst="straightConnector1">
+            <a:avLst/>
+          </a:prstGeom>
+          <a:ln w="28575">
+            <a:solidFill>
+              <a:srgbClr val="FF0000"/>
+            </a:solidFill>
+            <a:tailEnd type="triangle"/>
+          </a:ln>
+        </p:spPr>
+        <p:style>
+          <a:lnRef idx="1">
+            <a:schemeClr val="accent1"/>
+          </a:lnRef>
+          <a:fillRef idx="0">
+            <a:schemeClr val="accent1"/>
+          </a:fillRef>
+          <a:effectRef idx="0">
+            <a:schemeClr val="accent1"/>
+          </a:effectRef>
+          <a:fontRef idx="minor">
+            <a:schemeClr val="tx1"/>
+          </a:fontRef>
+        </p:style>
+      </p:cxnSp>
+      <p:cxnSp>
+        <p:nvCxnSpPr>
+          <p:cNvPr id="15" name="Straight Arrow Connector 14">
+            <a:extLst>
+              <a:ext uri="{FF2B5EF4-FFF2-40B4-BE49-F238E27FC236}">
+                <a16:creationId xmlns:a16="http://schemas.microsoft.com/office/drawing/2014/main" id="{67322368-0E8F-450B-9F9A-EFE40CC928CB}"/>
+              </a:ext>
+            </a:extLst>
+          </p:cNvPr>
+          <p:cNvCxnSpPr>
+            <a:cxnSpLocks/>
+            <a:stCxn id="13" idx="2"/>
+            <a:endCxn id="10" idx="0"/>
+          </p:cNvCxnSpPr>
+          <p:nvPr/>
+        </p:nvCxnSpPr>
+        <p:spPr>
+          <a:xfrm flipH="1">
+            <a:off x="6227686" y="1742570"/>
+            <a:ext cx="3961860" cy="2385546"/>
+          </a:xfrm>
+          <a:prstGeom prst="straightConnector1">
+            <a:avLst/>
+          </a:prstGeom>
+          <a:ln w="28575">
+            <a:solidFill>
+              <a:srgbClr val="FF0000"/>
+            </a:solidFill>
+            <a:tailEnd type="triangle"/>
+          </a:ln>
+        </p:spPr>
+        <p:style>
+          <a:lnRef idx="1">
+            <a:schemeClr val="accent1"/>
+          </a:lnRef>
+          <a:fillRef idx="0">
+            <a:schemeClr val="accent1"/>
+          </a:fillRef>
+          <a:effectRef idx="0">
+            <a:schemeClr val="accent1"/>
+          </a:effectRef>
+          <a:fontRef idx="minor">
+            <a:schemeClr val="tx1"/>
+          </a:fontRef>
+        </p:style>
+      </p:cxnSp>
     </p:spTree>
     <p:extLst>
       <p:ext uri="{BB962C8B-B14F-4D97-AF65-F5344CB8AC3E}">
@@ -3298,10 +3493,9 @@
           <a:lstStyle/>
           <a:p>
             <a:r>
-              <a:rPr lang="en-US" dirty="0" smtClean="0"/>
+              <a:rPr lang="en-US" dirty="0"/>
               <a:t>Updating FP.vi 3</a:t>
             </a:r>
-            <a:endParaRPr lang="en-US" dirty="0"/>
           </a:p>
         </p:txBody>
       </p:sp>
@@ -3321,26 +3515,26 @@
           <a:lstStyle/>
           <a:p>
             <a:r>
-              <a:rPr lang="en-US" dirty="0" smtClean="0"/>
+              <a:rPr lang="en-US" dirty="0"/>
               <a:t>Save Your Work</a:t>
             </a:r>
           </a:p>
           <a:p>
             <a:r>
-              <a:rPr lang="en-US" dirty="0" smtClean="0"/>
+              <a:rPr lang="en-US" dirty="0"/>
               <a:t>Now you may make any other changes to the FP.vi program that you would like to do</a:t>
             </a:r>
           </a:p>
           <a:p>
             <a:r>
-              <a:rPr lang="en-US" dirty="0" smtClean="0"/>
+              <a:rPr lang="en-US" dirty="0"/>
               <a:t>Build new executable</a:t>
             </a:r>
           </a:p>
           <a:p>
             <a:pPr lvl="1"/>
             <a:r>
-              <a:rPr lang="en-US" dirty="0" smtClean="0"/>
+              <a:rPr lang="en-US" dirty="0"/>
               <a:t>In the project explorer, right click on “FP” and click “Build”</a:t>
             </a:r>
           </a:p>
@@ -3392,10 +3586,9 @@
           <a:lstStyle/>
           <a:p>
             <a:r>
-              <a:rPr lang="en-US" dirty="0" smtClean="0"/>
+              <a:rPr lang="en-US" dirty="0"/>
               <a:t>Getting the source files</a:t>
             </a:r>
-            <a:endParaRPr lang="en-US" dirty="0"/>
           </a:p>
         </p:txBody>
       </p:sp>
@@ -3415,20 +3608,20 @@
           <a:lstStyle/>
           <a:p>
             <a:r>
-              <a:rPr lang="en-US" dirty="0" smtClean="0"/>
+              <a:rPr lang="en-US" dirty="0"/>
               <a:t>Sasha maintains the latest software at this address: </a:t>
             </a:r>
             <a:r>
-              <a:rPr lang="en-US" dirty="0" smtClean="0">
+              <a:rPr lang="en-US" dirty="0">
                 <a:hlinkClick r:id="rId2"/>
               </a:rPr>
               <a:t>https://www.dropbox.com/sh/0uff2d3bj8loh5t/AAAnuTq0b2AGORhbXHZCkF-fa?dl=0</a:t>
             </a:r>
-            <a:endParaRPr lang="en-US" dirty="0" smtClean="0"/>
-          </a:p>
-          <a:p>
-            <a:r>
-              <a:rPr lang="en-US" dirty="0" smtClean="0"/>
+            <a:endParaRPr lang="en-US" dirty="0"/>
+          </a:p>
+          <a:p>
+            <a:r>
+              <a:rPr lang="en-US" dirty="0"/>
               <a:t>Go into each folder, FP and TC, and download the “1. Sources” folders. Keep track of which one is FP and TC (when you download them they will both be called “1. Sources.zip”)</a:t>
             </a:r>
           </a:p>
@@ -3510,10 +3703,9 @@
           <a:lstStyle/>
           <a:p>
             <a:r>
-              <a:rPr lang="en-US" dirty="0" smtClean="0"/>
+              <a:rPr lang="en-US" dirty="0"/>
               <a:t>Our Source Files</a:t>
             </a:r>
-            <a:endParaRPr lang="en-US" dirty="0"/>
           </a:p>
         </p:txBody>
       </p:sp>
@@ -3538,24 +3730,23 @@
           <a:lstStyle/>
           <a:p>
             <a:r>
-              <a:rPr lang="en-US" dirty="0" smtClean="0"/>
+              <a:rPr lang="en-US" dirty="0"/>
               <a:t>Maintained in the hg/ </a:t>
             </a:r>
             <a:r>
-              <a:rPr lang="en-US" dirty="0" err="1" smtClean="0"/>
+              <a:rPr lang="en-US" dirty="0" err="1"/>
               <a:t>Bitbucket</a:t>
             </a:r>
             <a:r>
-              <a:rPr lang="en-US" dirty="0" smtClean="0"/>
+              <a:rPr lang="en-US" dirty="0"/>
               <a:t> under “Leiden-FP” and “Leiden-TC”</a:t>
             </a:r>
           </a:p>
           <a:p>
             <a:r>
-              <a:rPr lang="en-US" dirty="0" smtClean="0"/>
+              <a:rPr lang="en-US" dirty="0"/>
               <a:t>Check these out to your local working directory</a:t>
             </a:r>
-            <a:endParaRPr lang="en-US" dirty="0"/>
           </a:p>
         </p:txBody>
       </p:sp>
@@ -3696,10 +3887,9 @@
           <a:lstStyle/>
           <a:p>
             <a:r>
-              <a:rPr lang="en-US" dirty="0" smtClean="0"/>
+              <a:rPr lang="en-US" dirty="0"/>
               <a:t>Merging the folders</a:t>
             </a:r>
-            <a:endParaRPr lang="en-US" dirty="0"/>
           </a:p>
         </p:txBody>
       </p:sp>
@@ -3726,58 +3916,57 @@
           <a:lstStyle/>
           <a:p>
             <a:r>
-              <a:rPr lang="en-US" dirty="0" smtClean="0"/>
+              <a:rPr lang="en-US" dirty="0"/>
               <a:t>In your working directory, browse to the appropriate source subfolder in the trunk directory</a:t>
             </a:r>
             <a:br>
-              <a:rPr lang="en-US" dirty="0" smtClean="0"/>
+              <a:rPr lang="en-US" dirty="0"/>
             </a:br>
             <a:r>
-              <a:rPr lang="en-US" dirty="0" smtClean="0"/>
+              <a:rPr lang="en-US" dirty="0"/>
               <a:t>(ex. C:\user\patrick\Leiden-TC\trunk\1. Sources TC)</a:t>
             </a:r>
           </a:p>
           <a:p>
             <a:r>
-              <a:rPr lang="en-US" dirty="0" smtClean="0"/>
+              <a:rPr lang="en-US" dirty="0"/>
               <a:t>Copy all of the files extracted from the new “1. Sources.zip” file into your working directory. Confirm that you wish to overwrite existing files.</a:t>
             </a:r>
           </a:p>
           <a:p>
             <a:r>
-              <a:rPr lang="en-US" dirty="0" smtClean="0"/>
+              <a:rPr lang="en-US" dirty="0"/>
               <a:t>You should now have several files and folders that show changes with what is in the SVN repository</a:t>
             </a:r>
           </a:p>
           <a:p>
             <a:r>
-              <a:rPr lang="en-US" strike="sngStrike" dirty="0" smtClean="0"/>
+              <a:rPr lang="en-US" strike="sngStrike" dirty="0"/>
               <a:t>Each folder will have a sub folder called “</a:t>
             </a:r>
             <a:r>
-              <a:rPr lang="en-US" strike="sngStrike" dirty="0" err="1" smtClean="0"/>
+              <a:rPr lang="en-US" strike="sngStrike" dirty="0" err="1"/>
               <a:t>TC_to_DSC</a:t>
             </a:r>
             <a:r>
-              <a:rPr lang="en-US" strike="sngStrike" dirty="0" smtClean="0"/>
+              <a:rPr lang="en-US" strike="sngStrike" dirty="0"/>
               <a:t>” and “</a:t>
             </a:r>
             <a:r>
-              <a:rPr lang="en-US" strike="sngStrike" dirty="0" err="1" smtClean="0"/>
+              <a:rPr lang="en-US" strike="sngStrike" dirty="0" err="1"/>
               <a:t>FP_to_DSC</a:t>
             </a:r>
             <a:r>
-              <a:rPr lang="en-US" strike="sngStrike" dirty="0" smtClean="0"/>
+              <a:rPr lang="en-US" strike="sngStrike" dirty="0"/>
               <a:t>”. You will use these later.</a:t>
             </a:r>
           </a:p>
           <a:p>
             <a:pPr lvl="1"/>
             <a:r>
-              <a:rPr lang="en-US" dirty="0" smtClean="0"/>
+              <a:rPr lang="en-US" dirty="0"/>
               <a:t>I moved these Vis to a new package called “Leiden Tools”</a:t>
             </a:r>
-            <a:endParaRPr lang="en-US" dirty="0"/>
           </a:p>
         </p:txBody>
       </p:sp>
@@ -3857,10 +4046,9 @@
           <a:lstStyle/>
           <a:p>
             <a:r>
-              <a:rPr lang="en-US" dirty="0" smtClean="0"/>
+              <a:rPr lang="en-US" dirty="0"/>
               <a:t>Updating TC.vi 1: Fix class problem</a:t>
             </a:r>
-            <a:endParaRPr lang="en-US" dirty="0"/>
           </a:p>
         </p:txBody>
       </p:sp>
@@ -3885,29 +4073,29 @@
           <a:lstStyle/>
           <a:p>
             <a:r>
-              <a:rPr lang="en-US" dirty="0" smtClean="0"/>
+              <a:rPr lang="en-US" dirty="0"/>
               <a:t>Open </a:t>
             </a:r>
             <a:r>
-              <a:rPr lang="en-US" dirty="0" err="1" smtClean="0"/>
+              <a:rPr lang="en-US" dirty="0" err="1"/>
               <a:t>CurrentSource.lvproj</a:t>
             </a:r>
             <a:r>
-              <a:rPr lang="en-US" dirty="0" smtClean="0"/>
+              <a:rPr lang="en-US" dirty="0"/>
               <a:t> in LabVIEW.</a:t>
             </a:r>
           </a:p>
           <a:p>
             <a:r>
-              <a:rPr lang="en-US" dirty="0" smtClean="0"/>
+              <a:rPr lang="en-US" dirty="0"/>
               <a:t>Open </a:t>
             </a:r>
             <a:r>
-              <a:rPr lang="en-US" dirty="0" err="1" smtClean="0"/>
+              <a:rPr lang="en-US" dirty="0" err="1"/>
               <a:t>CS.lvclass</a:t>
             </a:r>
             <a:r>
-              <a:rPr lang="en-US" dirty="0" smtClean="0"/>
+              <a:rPr lang="en-US" dirty="0"/>
               <a:t> Properties and go to item settings, initialize.vi, and uncheck “Require overrides of this dynamic dispatch VI to always invoke the Call Parent Method”</a:t>
             </a:r>
           </a:p>
@@ -4038,26 +4226,25 @@
           <a:lstStyle/>
           <a:p>
             <a:r>
-              <a:rPr lang="en-US" dirty="0" smtClean="0"/>
+              <a:rPr lang="en-US" dirty="0"/>
               <a:t>Updating TC.vi 2: Add </a:t>
             </a:r>
             <a:r>
-              <a:rPr lang="en-US" dirty="0" err="1" smtClean="0"/>
+              <a:rPr lang="en-US" dirty="0" err="1"/>
               <a:t>subVI</a:t>
             </a:r>
             <a:r>
-              <a:rPr lang="en-US" dirty="0" smtClean="0"/>
+              <a:rPr lang="en-US" dirty="0"/>
               <a:t> to get </a:t>
             </a:r>
             <a:r>
-              <a:rPr lang="en-US" dirty="0" err="1" smtClean="0"/>
+              <a:rPr lang="en-US" dirty="0" err="1"/>
               <a:t>cpu</a:t>
             </a:r>
             <a:r>
-              <a:rPr lang="en-US" dirty="0" smtClean="0"/>
+              <a:rPr lang="en-US" dirty="0"/>
               <a:t> name</a:t>
             </a:r>
-            <a:endParaRPr lang="en-US" dirty="0"/>
           </a:p>
         </p:txBody>
       </p:sp>
@@ -4077,22 +4264,17 @@
           <a:lstStyle/>
           <a:p>
             <a:r>
-              <a:rPr lang="en-US" dirty="0" smtClean="0"/>
+              <a:rPr lang="en-US" dirty="0"/>
               <a:t>Open </a:t>
             </a:r>
             <a:r>
-              <a:rPr lang="en-US" dirty="0" err="1" smtClean="0"/>
+              <a:rPr lang="en-US" dirty="0" err="1"/>
               <a:t>TC.lvproj</a:t>
             </a:r>
             <a:r>
-              <a:rPr lang="en-US" dirty="0" smtClean="0"/>
-              <a:t>. This probably take a while. Open </a:t>
-            </a:r>
-            <a:r>
-              <a:rPr lang="en-US" dirty="0" smtClean="0"/>
-              <a:t>TC.vi</a:t>
-            </a:r>
-            <a:endParaRPr lang="en-US" dirty="0" smtClean="0"/>
+              <a:rPr lang="en-US" dirty="0"/>
+              <a:t>. This probably take a while. Open TC.vi</a:t>
+            </a:r>
           </a:p>
         </p:txBody>
       </p:sp>
@@ -4142,18 +4324,17 @@
           <a:lstStyle/>
           <a:p>
             <a:r>
-              <a:rPr lang="en-US" dirty="0" smtClean="0"/>
+              <a:rPr lang="en-US" dirty="0"/>
               <a:t>Updating TC.vi 3: Add </a:t>
             </a:r>
             <a:r>
-              <a:rPr lang="en-US" dirty="0" err="1" smtClean="0"/>
+              <a:rPr lang="en-US" dirty="0" err="1"/>
               <a:t>subVI</a:t>
             </a:r>
             <a:r>
-              <a:rPr lang="en-US" dirty="0" smtClean="0"/>
+              <a:rPr lang="en-US" dirty="0"/>
               <a:t> to save to DSC</a:t>
             </a:r>
-            <a:endParaRPr lang="en-US" dirty="0"/>
           </a:p>
         </p:txBody>
       </p:sp>
@@ -4178,18 +4359,17 @@
           <a:lstStyle/>
           <a:p>
             <a:r>
-              <a:rPr lang="en-US" dirty="0" smtClean="0"/>
+              <a:rPr lang="en-US" dirty="0"/>
               <a:t>Find the Event Loop “&lt;</a:t>
             </a:r>
             <a:r>
-              <a:rPr lang="en-US" dirty="0" err="1" smtClean="0"/>
+              <a:rPr lang="en-US" dirty="0" err="1"/>
               <a:t>UpdateValuesAVS</a:t>
             </a:r>
             <a:r>
-              <a:rPr lang="en-US" dirty="0" smtClean="0"/>
+              <a:rPr lang="en-US" dirty="0"/>
               <a:t>&gt;”. Modify it to look like this:</a:t>
             </a:r>
-            <a:endParaRPr lang="en-US" dirty="0"/>
           </a:p>
         </p:txBody>
       </p:sp>
@@ -4304,18 +4484,17 @@
           <a:lstStyle/>
           <a:p>
             <a:r>
-              <a:rPr lang="en-US" dirty="0" smtClean="0"/>
+              <a:rPr lang="en-US" dirty="0"/>
               <a:t>Updating TC.vi 4: Add </a:t>
             </a:r>
             <a:r>
-              <a:rPr lang="en-US" dirty="0" err="1" smtClean="0"/>
+              <a:rPr lang="en-US" dirty="0" err="1"/>
               <a:t>subVI</a:t>
             </a:r>
             <a:r>
-              <a:rPr lang="en-US" dirty="0" smtClean="0"/>
+              <a:rPr lang="en-US" dirty="0"/>
               <a:t> to save to DSC</a:t>
             </a:r>
-            <a:endParaRPr lang="en-US" dirty="0"/>
           </a:p>
         </p:txBody>
       </p:sp>
@@ -4340,18 +4519,17 @@
           <a:lstStyle/>
           <a:p>
             <a:r>
-              <a:rPr lang="en-US" dirty="0" smtClean="0"/>
+              <a:rPr lang="en-US" dirty="0"/>
               <a:t>Find the Event Loop “&lt;</a:t>
             </a:r>
             <a:r>
-              <a:rPr lang="en-US" dirty="0" err="1" smtClean="0"/>
+              <a:rPr lang="en-US" dirty="0" err="1"/>
               <a:t>UpdateValuesZBridge</a:t>
             </a:r>
             <a:r>
-              <a:rPr lang="en-US" dirty="0" smtClean="0"/>
+              <a:rPr lang="en-US" dirty="0"/>
               <a:t>&gt;”. Modify it to look like this:</a:t>
             </a:r>
-            <a:endParaRPr lang="en-US" dirty="0"/>
           </a:p>
         </p:txBody>
       </p:sp>
@@ -4466,10 +4644,9 @@
           <a:lstStyle/>
           <a:p>
             <a:r>
-              <a:rPr lang="en-US" dirty="0" smtClean="0"/>
+              <a:rPr lang="en-US" dirty="0"/>
               <a:t>Updating TC.vi 5</a:t>
             </a:r>
-            <a:endParaRPr lang="en-US" dirty="0"/>
           </a:p>
         </p:txBody>
       </p:sp>
@@ -4489,26 +4666,26 @@
           <a:lstStyle/>
           <a:p>
             <a:r>
-              <a:rPr lang="en-US" dirty="0" smtClean="0"/>
+              <a:rPr lang="en-US" dirty="0"/>
               <a:t>Save Your Work</a:t>
             </a:r>
           </a:p>
           <a:p>
             <a:r>
-              <a:rPr lang="en-US" dirty="0" smtClean="0"/>
+              <a:rPr lang="en-US" dirty="0"/>
               <a:t>Now you may make any other changes to the TC.vi program that you would like to do</a:t>
             </a:r>
           </a:p>
           <a:p>
             <a:r>
-              <a:rPr lang="en-US" dirty="0" smtClean="0"/>
+              <a:rPr lang="en-US" dirty="0"/>
               <a:t>Build new executable</a:t>
             </a:r>
           </a:p>
           <a:p>
             <a:pPr lvl="1"/>
             <a:r>
-              <a:rPr lang="en-US" dirty="0" smtClean="0"/>
+              <a:rPr lang="en-US" dirty="0"/>
               <a:t>In the project explorer, right click on “TC” and click “Build”</a:t>
             </a:r>
           </a:p>

</xml_diff>